<commit_message>
Kate says I should be done; didn't do invasion analysis by running through simulations yet
</commit_message>
<xml_diff>
--- a/JDH_poster_draft.pptx
+++ b/JDH_poster_draft.pptx
@@ -2973,10 +2973,10 @@
       </p:grpSpPr>
       <p:pic>
         <p:nvPicPr>
-          <p:cNvPr id="400" name="Picture 399">
-            <a:extLst>
-              <a:ext uri="{FF2B5EF4-FFF2-40B4-BE49-F238E27FC236}">
-                <a16:creationId xmlns:a16="http://schemas.microsoft.com/office/drawing/2014/main" id="{B9D58ADB-86EF-A5CF-8F69-31544B1C3744}"/>
+          <p:cNvPr id="459" name="Picture 458">
+            <a:extLst>
+              <a:ext uri="{FF2B5EF4-FFF2-40B4-BE49-F238E27FC236}">
+                <a16:creationId xmlns:a16="http://schemas.microsoft.com/office/drawing/2014/main" id="{1B2F7D55-0991-56AF-4CF6-4D6E38C13EE4}"/>
               </a:ext>
             </a:extLst>
           </p:cNvPr>
@@ -2993,8 +2993,8 @@
         </p:blipFill>
         <p:spPr>
           <a:xfrm>
-            <a:off x="27636326" y="12952173"/>
-            <a:ext cx="4237387" cy="3255264"/>
+            <a:off x="2839389" y="26610821"/>
+            <a:ext cx="12407232" cy="5500372"/>
           </a:xfrm>
           <a:prstGeom prst="rect">
             <a:avLst/>
@@ -3003,10 +3003,10 @@
       </p:pic>
       <p:pic>
         <p:nvPicPr>
-          <p:cNvPr id="416" name="Picture 415">
-            <a:extLst>
-              <a:ext uri="{FF2B5EF4-FFF2-40B4-BE49-F238E27FC236}">
-                <a16:creationId xmlns:a16="http://schemas.microsoft.com/office/drawing/2014/main" id="{B497DCD6-FCF3-5EC8-F791-FD52965A1730}"/>
+          <p:cNvPr id="455" name="Picture 454">
+            <a:extLst>
+              <a:ext uri="{FF2B5EF4-FFF2-40B4-BE49-F238E27FC236}">
+                <a16:creationId xmlns:a16="http://schemas.microsoft.com/office/drawing/2014/main" id="{AAA315A1-34A6-3EBF-3677-FD109878A384}"/>
               </a:ext>
             </a:extLst>
           </p:cNvPr>
@@ -3023,8 +3023,8 @@
         </p:blipFill>
         <p:spPr>
           <a:xfrm>
-            <a:off x="18205692" y="12917086"/>
-            <a:ext cx="4303300" cy="3255264"/>
+            <a:off x="18169024" y="12922862"/>
+            <a:ext cx="4340352" cy="3255264"/>
           </a:xfrm>
           <a:prstGeom prst="rect">
             <a:avLst/>
@@ -3033,10 +3033,10 @@
       </p:pic>
       <p:pic>
         <p:nvPicPr>
-          <p:cNvPr id="395" name="Picture 394">
-            <a:extLst>
-              <a:ext uri="{FF2B5EF4-FFF2-40B4-BE49-F238E27FC236}">
-                <a16:creationId xmlns:a16="http://schemas.microsoft.com/office/drawing/2014/main" id="{179D2ED8-39D3-0570-BE86-5CF13AAD0769}"/>
+          <p:cNvPr id="446" name="Picture 445">
+            <a:extLst>
+              <a:ext uri="{FF2B5EF4-FFF2-40B4-BE49-F238E27FC236}">
+                <a16:creationId xmlns:a16="http://schemas.microsoft.com/office/drawing/2014/main" id="{DA068B06-CB6C-7985-BA5E-DF6C00680B64}"/>
               </a:ext>
             </a:extLst>
           </p:cNvPr>
@@ -3053,8 +3053,8 @@
         </p:blipFill>
         <p:spPr>
           <a:xfrm>
-            <a:off x="23347288" y="12954444"/>
-            <a:ext cx="4237387" cy="3255264"/>
+            <a:off x="27587825" y="12966641"/>
+            <a:ext cx="4269695" cy="3255264"/>
           </a:xfrm>
           <a:prstGeom prst="rect">
             <a:avLst/>
@@ -3063,10 +3063,10 @@
       </p:pic>
       <p:pic>
         <p:nvPicPr>
-          <p:cNvPr id="393" name="Picture 392">
-            <a:extLst>
-              <a:ext uri="{FF2B5EF4-FFF2-40B4-BE49-F238E27FC236}">
-                <a16:creationId xmlns:a16="http://schemas.microsoft.com/office/drawing/2014/main" id="{482A40E5-273F-0049-9804-0229C0C9745F}"/>
+          <p:cNvPr id="448" name="Picture 447">
+            <a:extLst>
+              <a:ext uri="{FF2B5EF4-FFF2-40B4-BE49-F238E27FC236}">
+                <a16:creationId xmlns:a16="http://schemas.microsoft.com/office/drawing/2014/main" id="{022BDBC8-8C10-23CF-E743-E77D08BBB281}"/>
               </a:ext>
             </a:extLst>
           </p:cNvPr>
@@ -3083,8 +3083,8 @@
         </p:blipFill>
         <p:spPr>
           <a:xfrm>
-            <a:off x="18304546" y="8417953"/>
-            <a:ext cx="4208591" cy="3255264"/>
+            <a:off x="23215720" y="12966641"/>
+            <a:ext cx="4269695" cy="3255264"/>
           </a:xfrm>
           <a:prstGeom prst="rect">
             <a:avLst/>
@@ -3093,10 +3093,10 @@
       </p:pic>
       <p:pic>
         <p:nvPicPr>
-          <p:cNvPr id="388" name="Picture 387">
-            <a:extLst>
-              <a:ext uri="{FF2B5EF4-FFF2-40B4-BE49-F238E27FC236}">
-                <a16:creationId xmlns:a16="http://schemas.microsoft.com/office/drawing/2014/main" id="{93E0FE1A-F24B-3E43-20CD-C0C88F3C9763}"/>
+          <p:cNvPr id="442" name="Picture 441">
+            <a:extLst>
+              <a:ext uri="{FF2B5EF4-FFF2-40B4-BE49-F238E27FC236}">
+                <a16:creationId xmlns:a16="http://schemas.microsoft.com/office/drawing/2014/main" id="{CE596BD8-CA7F-1434-3FA1-3BBB7E702F27}"/>
               </a:ext>
             </a:extLst>
           </p:cNvPr>
@@ -3113,8 +3113,8 @@
         </p:blipFill>
         <p:spPr>
           <a:xfrm>
-            <a:off x="27518862" y="8417258"/>
-            <a:ext cx="4267141" cy="3255264"/>
+            <a:off x="27460825" y="8444098"/>
+            <a:ext cx="4269695" cy="3255264"/>
           </a:xfrm>
           <a:prstGeom prst="rect">
             <a:avLst/>
@@ -3123,10 +3123,10 @@
       </p:pic>
       <p:pic>
         <p:nvPicPr>
-          <p:cNvPr id="376" name="Picture 375">
-            <a:extLst>
-              <a:ext uri="{FF2B5EF4-FFF2-40B4-BE49-F238E27FC236}">
-                <a16:creationId xmlns:a16="http://schemas.microsoft.com/office/drawing/2014/main" id="{447D31A7-E908-3B95-5DC1-D81AA39D9601}"/>
+          <p:cNvPr id="444" name="Picture 443">
+            <a:extLst>
+              <a:ext uri="{FF2B5EF4-FFF2-40B4-BE49-F238E27FC236}">
+                <a16:creationId xmlns:a16="http://schemas.microsoft.com/office/drawing/2014/main" id="{2BFDD001-A094-0EFA-8154-94905A0E5589}"/>
               </a:ext>
             </a:extLst>
           </p:cNvPr>
@@ -3143,8 +3143,38 @@
         </p:blipFill>
         <p:spPr>
           <a:xfrm>
-            <a:off x="23257554" y="8411622"/>
-            <a:ext cx="4261306" cy="3250813"/>
+            <a:off x="23165106" y="8446200"/>
+            <a:ext cx="4269695" cy="3255264"/>
+          </a:xfrm>
+          <a:prstGeom prst="rect">
+            <a:avLst/>
+          </a:prstGeom>
+        </p:spPr>
+      </p:pic>
+      <p:pic>
+        <p:nvPicPr>
+          <p:cNvPr id="440" name="Picture 439">
+            <a:extLst>
+              <a:ext uri="{FF2B5EF4-FFF2-40B4-BE49-F238E27FC236}">
+                <a16:creationId xmlns:a16="http://schemas.microsoft.com/office/drawing/2014/main" id="{09C23625-DFD4-943B-69DA-C9FDCA84D822}"/>
+              </a:ext>
+            </a:extLst>
+          </p:cNvPr>
+          <p:cNvPicPr>
+            <a:picLocks noChangeAspect="1"/>
+          </p:cNvPicPr>
+          <p:nvPr/>
+        </p:nvPicPr>
+        <p:blipFill>
+          <a:blip r:embed="rId8"/>
+          <a:stretch>
+            <a:fillRect/>
+          </a:stretch>
+        </p:blipFill>
+        <p:spPr>
+          <a:xfrm>
+            <a:off x="18170452" y="8446407"/>
+            <a:ext cx="4373779" cy="3255264"/>
           </a:xfrm>
           <a:prstGeom prst="rect">
             <a:avLst/>
@@ -3258,7 +3288,7 @@
           <p:nvPr/>
         </p:nvPicPr>
         <p:blipFill>
-          <a:blip r:embed="rId8">
+          <a:blip r:embed="rId9">
             <a:extLst>
               <a:ext uri="{28A0092B-C50C-407E-A947-70E740481C1C}">
                 <a14:useLocalDpi xmlns:a14="http://schemas.microsoft.com/office/drawing/2010/main" val="0"/>
@@ -3665,7 +3695,7 @@
           <p:nvPr/>
         </p:nvPicPr>
         <p:blipFill>
-          <a:blip r:embed="rId9"/>
+          <a:blip r:embed="rId10"/>
           <a:stretch>
             <a:fillRect/>
           </a:stretch>
@@ -4275,7 +4305,7 @@
           <p:nvPr/>
         </p:nvPicPr>
         <p:blipFill>
-          <a:blip r:embed="rId10"/>
+          <a:blip r:embed="rId11"/>
           <a:stretch>
             <a:fillRect/>
           </a:stretch>
@@ -4305,7 +4335,7 @@
           <p:nvPr/>
         </p:nvPicPr>
         <p:blipFill>
-          <a:blip r:embed="rId11"/>
+          <a:blip r:embed="rId12"/>
           <a:stretch>
             <a:fillRect/>
           </a:stretch>
@@ -4516,7 +4546,7 @@
             <p:nvPr/>
           </p:nvPicPr>
           <p:blipFill>
-            <a:blip r:embed="rId12"/>
+            <a:blip r:embed="rId13"/>
             <a:stretch>
               <a:fillRect/>
             </a:stretch>
@@ -4641,7 +4671,7 @@
             <p:nvPr/>
           </p:nvPicPr>
           <p:blipFill>
-            <a:blip r:embed="rId13"/>
+            <a:blip r:embed="rId14"/>
             <a:stretch>
               <a:fillRect/>
             </a:stretch>
@@ -4708,7 +4738,7 @@
             <p:nvPr/>
           </p:nvPicPr>
           <p:blipFill>
-            <a:blip r:embed="rId14"/>
+            <a:blip r:embed="rId15"/>
             <a:stretch>
               <a:fillRect/>
             </a:stretch>
@@ -4918,41 +4948,6 @@
       </p:sp>
       <p:pic>
         <p:nvPicPr>
-          <p:cNvPr id="147" name="Google Shape;310;p28">
-            <a:extLst>
-              <a:ext uri="{FF2B5EF4-FFF2-40B4-BE49-F238E27FC236}">
-                <a16:creationId xmlns:a16="http://schemas.microsoft.com/office/drawing/2014/main" id="{214602AA-05DC-9EC9-C49E-5E83F34EFD11}"/>
-              </a:ext>
-            </a:extLst>
-          </p:cNvPr>
-          <p:cNvPicPr preferRelativeResize="0">
-            <a:picLocks noChangeAspect="1"/>
-          </p:cNvPicPr>
-          <p:nvPr/>
-        </p:nvPicPr>
-        <p:blipFill rotWithShape="1">
-          <a:blip r:embed="rId15">
-            <a:alphaModFix/>
-          </a:blip>
-          <a:srcRect r="48348"/>
-          <a:stretch/>
-        </p:blipFill>
-        <p:spPr>
-          <a:xfrm>
-            <a:off x="2449704" y="26554343"/>
-            <a:ext cx="6762676" cy="5799859"/>
-          </a:xfrm>
-          <a:prstGeom prst="rect">
-            <a:avLst/>
-          </a:prstGeom>
-          <a:noFill/>
-          <a:ln>
-            <a:noFill/>
-          </a:ln>
-        </p:spPr>
-      </p:pic>
-      <p:pic>
-        <p:nvPicPr>
           <p:cNvPr id="148" name="Picture 147">
             <a:extLst>
               <a:ext uri="{FF2B5EF4-FFF2-40B4-BE49-F238E27FC236}">
@@ -4986,41 +4981,6 @@
           </a:ln>
         </p:spPr>
       </p:pic>
-      <p:pic>
-        <p:nvPicPr>
-          <p:cNvPr id="150" name="Google Shape;310;p28">
-            <a:extLst>
-              <a:ext uri="{FF2B5EF4-FFF2-40B4-BE49-F238E27FC236}">
-                <a16:creationId xmlns:a16="http://schemas.microsoft.com/office/drawing/2014/main" id="{B6F770F4-6934-CA21-647F-A4B56044DCB1}"/>
-              </a:ext>
-            </a:extLst>
-          </p:cNvPr>
-          <p:cNvPicPr preferRelativeResize="0">
-            <a:picLocks noChangeAspect="1"/>
-          </p:cNvPicPr>
-          <p:nvPr/>
-        </p:nvPicPr>
-        <p:blipFill rotWithShape="1">
-          <a:blip r:embed="rId15">
-            <a:alphaModFix/>
-          </a:blip>
-          <a:srcRect l="51652"/>
-          <a:stretch/>
-        </p:blipFill>
-        <p:spPr>
-          <a:xfrm>
-            <a:off x="9191306" y="26577204"/>
-            <a:ext cx="6280131" cy="5754139"/>
-          </a:xfrm>
-          <a:prstGeom prst="rect">
-            <a:avLst/>
-          </a:prstGeom>
-          <a:noFill/>
-          <a:ln>
-            <a:noFill/>
-          </a:ln>
-        </p:spPr>
-      </p:pic>
       <p:sp>
         <p:nvSpPr>
           <p:cNvPr id="152" name="TextBox 151">
@@ -5073,7 +5033,7 @@
         </p:nvSpPr>
         <p:spPr>
           <a:xfrm>
-            <a:off x="16742664" y="16901579"/>
+            <a:off x="16742664" y="16850779"/>
             <a:ext cx="15087599" cy="2015936"/>
           </a:xfrm>
           <a:prstGeom prst="rect">
@@ -5419,7 +5379,7 @@
             <a:avLst/>
           </a:prstGeom>
           <a:noFill/>
-          <a:ln w="101600" cap="flat" cmpd="sng">
+          <a:ln w="63500" cap="flat" cmpd="sng">
             <a:solidFill>
               <a:schemeClr val="tx1"/>
             </a:solidFill>
@@ -5639,7 +5599,7 @@
         </p:nvSpPr>
         <p:spPr>
           <a:xfrm>
-            <a:off x="17330194" y="16105849"/>
+            <a:off x="17330194" y="16131249"/>
             <a:ext cx="6561696" cy="569356"/>
           </a:xfrm>
           <a:prstGeom prst="rect">
@@ -5752,7 +5712,7 @@
         </p:nvSpPr>
         <p:spPr>
           <a:xfrm>
-            <a:off x="18131659" y="12342330"/>
+            <a:off x="18131659" y="12240730"/>
             <a:ext cx="911292" cy="523220"/>
           </a:xfrm>
           <a:prstGeom prst="rect">
@@ -5858,7 +5818,7 @@
         </p:nvSpPr>
         <p:spPr>
           <a:xfrm>
-            <a:off x="24823112" y="16099293"/>
+            <a:off x="24823112" y="16124693"/>
             <a:ext cx="1899457" cy="569356"/>
           </a:xfrm>
           <a:prstGeom prst="rect">
@@ -5911,7 +5871,7 @@
         </p:nvSpPr>
         <p:spPr>
           <a:xfrm>
-            <a:off x="28960453" y="16111241"/>
+            <a:off x="28960453" y="16136641"/>
             <a:ext cx="1938855" cy="569356"/>
           </a:xfrm>
           <a:prstGeom prst="rect">
@@ -5994,7 +5954,7 @@
         </p:nvSpPr>
         <p:spPr>
           <a:xfrm>
-            <a:off x="24479325" y="11581827"/>
+            <a:off x="24479325" y="11632627"/>
             <a:ext cx="2243242" cy="569356"/>
           </a:xfrm>
           <a:prstGeom prst="rect">
@@ -6047,7 +6007,7 @@
         </p:nvSpPr>
         <p:spPr>
           <a:xfrm>
-            <a:off x="28890285" y="11588231"/>
+            <a:off x="28890285" y="11639031"/>
             <a:ext cx="2243242" cy="569356"/>
           </a:xfrm>
           <a:prstGeom prst="rect">
@@ -6108,7 +6068,7 @@
         </p:blipFill>
         <p:spPr>
           <a:xfrm>
-            <a:off x="30618275" y="14961918"/>
+            <a:off x="30618275" y="14860318"/>
             <a:ext cx="281033" cy="209527"/>
           </a:xfrm>
           <a:prstGeom prst="rect">
@@ -7361,7 +7321,7 @@
         </p:blipFill>
         <p:spPr>
           <a:xfrm>
-            <a:off x="16992673" y="8660841"/>
+            <a:off x="16967273" y="8660841"/>
             <a:ext cx="1138986" cy="760223"/>
           </a:xfrm>
           <a:prstGeom prst="rect">
@@ -7493,58 +7453,6 @@
       </p:sp>
       <p:sp>
         <p:nvSpPr>
-          <p:cNvPr id="364" name="Rectangle 363">
-            <a:extLst>
-              <a:ext uri="{FF2B5EF4-FFF2-40B4-BE49-F238E27FC236}">
-                <a16:creationId xmlns:a16="http://schemas.microsoft.com/office/drawing/2014/main" id="{B0DBAEF1-BB10-19BD-51EF-D98D77D8692F}"/>
-              </a:ext>
-            </a:extLst>
-          </p:cNvPr>
-          <p:cNvSpPr/>
-          <p:nvPr/>
-        </p:nvSpPr>
-        <p:spPr>
-          <a:xfrm>
-            <a:off x="31373066" y="15922275"/>
-            <a:ext cx="648653" cy="646331"/>
-          </a:xfrm>
-          <a:prstGeom prst="rect">
-            <a:avLst/>
-          </a:prstGeom>
-          <a:solidFill>
-            <a:schemeClr val="bg1"/>
-          </a:solidFill>
-          <a:ln>
-            <a:noFill/>
-          </a:ln>
-        </p:spPr>
-        <p:style>
-          <a:lnRef idx="2">
-            <a:schemeClr val="accent1">
-              <a:shade val="50000"/>
-            </a:schemeClr>
-          </a:lnRef>
-          <a:fillRef idx="1">
-            <a:schemeClr val="accent1"/>
-          </a:fillRef>
-          <a:effectRef idx="0">
-            <a:schemeClr val="accent1"/>
-          </a:effectRef>
-          <a:fontRef idx="minor">
-            <a:schemeClr val="lt1"/>
-          </a:fontRef>
-        </p:style>
-        <p:txBody>
-          <a:bodyPr rtlCol="0" anchor="ctr"/>
-          <a:lstStyle/>
-          <a:p>
-            <a:pPr algn="ctr"/>
-            <a:endParaRPr lang="en-US"/>
-          </a:p>
-        </p:txBody>
-      </p:sp>
-      <p:sp>
-        <p:nvSpPr>
           <p:cNvPr id="379" name="Google Shape;589;p36">
             <a:extLst>
               <a:ext uri="{FF2B5EF4-FFF2-40B4-BE49-F238E27FC236}">
@@ -7557,8 +7465,8 @@
         </p:nvSpPr>
         <p:spPr>
           <a:xfrm>
-            <a:off x="18987667" y="8634975"/>
-            <a:ext cx="2202002" cy="954077"/>
+            <a:off x="18523528" y="8915388"/>
+            <a:ext cx="3039776" cy="492412"/>
           </a:xfrm>
           <a:prstGeom prst="rect">
             <a:avLst/>
@@ -7576,73 +7484,59 @@
           <a:p>
             <a:pPr algn="ctr"/>
             <a:r>
-              <a:rPr lang="en" sz="2500" b="1" dirty="0">
+              <a:rPr lang="en" sz="2000" b="1" dirty="0">
                 <a:latin typeface="Times New Roman" panose="02020603050405020304" pitchFamily="18" charset="0"/>
                 <a:cs typeface="Times New Roman" panose="02020603050405020304" pitchFamily="18" charset="0"/>
               </a:rPr>
               <a:t>Both </a:t>
             </a:r>
             <a:r>
-              <a:rPr lang="en" sz="2500" b="1" i="1" dirty="0">
+              <a:rPr lang="en" sz="2000" b="1" i="1" dirty="0">
                 <a:latin typeface="Times New Roman" panose="02020603050405020304" pitchFamily="18" charset="0"/>
                 <a:cs typeface="Times New Roman" panose="02020603050405020304" pitchFamily="18" charset="0"/>
               </a:rPr>
               <a:t>L</a:t>
             </a:r>
             <a:r>
-              <a:rPr lang="en" sz="2500" b="1" i="1" baseline="-25000" dirty="0">
+              <a:rPr lang="en" sz="2000" b="1" i="1" baseline="-25000" dirty="0">
                 <a:latin typeface="Times New Roman" panose="02020603050405020304" pitchFamily="18" charset="0"/>
                 <a:cs typeface="Times New Roman" panose="02020603050405020304" pitchFamily="18" charset="0"/>
               </a:rPr>
               <a:t>B</a:t>
             </a:r>
             <a:r>
-              <a:rPr lang="en" sz="2500" b="1" dirty="0">
+              <a:rPr lang="en" sz="2000" b="1" dirty="0">
                 <a:latin typeface="Times New Roman" panose="02020603050405020304" pitchFamily="18" charset="0"/>
                 <a:cs typeface="Times New Roman" panose="02020603050405020304" pitchFamily="18" charset="0"/>
               </a:rPr>
               <a:t>, </a:t>
             </a:r>
             <a:r>
-              <a:rPr lang="en" sz="2500" b="1" i="1" dirty="0">
+              <a:rPr lang="en" sz="2000" b="1" i="1" dirty="0">
                 <a:latin typeface="Times New Roman" panose="02020603050405020304" pitchFamily="18" charset="0"/>
                 <a:cs typeface="Times New Roman" panose="02020603050405020304" pitchFamily="18" charset="0"/>
               </a:rPr>
               <a:t>V</a:t>
             </a:r>
             <a:r>
-              <a:rPr lang="en" sz="2500" b="1" i="1" baseline="-25000" dirty="0">
+              <a:rPr lang="en" sz="2000" b="1" i="1" baseline="-25000" dirty="0">
                 <a:latin typeface="Times New Roman" panose="02020603050405020304" pitchFamily="18" charset="0"/>
                 <a:cs typeface="Times New Roman" panose="02020603050405020304" pitchFamily="18" charset="0"/>
               </a:rPr>
               <a:t>B</a:t>
             </a:r>
             <a:r>
-              <a:rPr lang="en" sz="2500" b="1" dirty="0">
+              <a:rPr lang="en" sz="2000" b="1" dirty="0">
                 <a:latin typeface="Times New Roman" panose="02020603050405020304" pitchFamily="18" charset="0"/>
                 <a:cs typeface="Times New Roman" panose="02020603050405020304" pitchFamily="18" charset="0"/>
               </a:rPr>
-              <a:t> </a:t>
-            </a:r>
-            <a:endParaRPr sz="2500" b="1" dirty="0">
+              <a:t> Invade</a:t>
+            </a:r>
+            <a:endParaRPr sz="2000" b="1" dirty="0">
               <a:latin typeface="Times New Roman" panose="02020603050405020304" pitchFamily="18" charset="0"/>
               <a:cs typeface="Times New Roman" panose="02020603050405020304" pitchFamily="18" charset="0"/>
             </a:endParaRPr>
           </a:p>
-          <a:p>
-            <a:pPr algn="ctr"/>
-            <a:r>
-              <a:rPr lang="en" sz="2500" b="1" dirty="0">
-                <a:latin typeface="Times New Roman" panose="02020603050405020304" pitchFamily="18" charset="0"/>
-                <a:cs typeface="Times New Roman" panose="02020603050405020304" pitchFamily="18" charset="0"/>
-              </a:rPr>
-              <a:t>Invade</a:t>
-            </a:r>
-            <a:endParaRPr sz="2500" b="1" dirty="0">
-              <a:latin typeface="Times New Roman" panose="02020603050405020304" pitchFamily="18" charset="0"/>
-              <a:cs typeface="Times New Roman" panose="02020603050405020304" pitchFamily="18" charset="0"/>
-            </a:endParaRPr>
-          </a:p>
         </p:txBody>
       </p:sp>
       <p:sp>
@@ -7659,8 +7553,8 @@
         </p:nvSpPr>
         <p:spPr>
           <a:xfrm>
-            <a:off x="20358251" y="10220913"/>
-            <a:ext cx="2127462" cy="954077"/>
+            <a:off x="20002323" y="10578115"/>
+            <a:ext cx="2127462" cy="492412"/>
           </a:xfrm>
           <a:prstGeom prst="rect">
             <a:avLst/>
@@ -7678,34 +7572,34 @@
           <a:p>
             <a:pPr algn="ctr"/>
             <a:r>
-              <a:rPr lang="en" sz="2500" b="1" dirty="0">
+              <a:rPr lang="en" sz="2000" b="1" dirty="0">
                 <a:latin typeface="Times New Roman" panose="02020603050405020304" pitchFamily="18" charset="0"/>
                 <a:cs typeface="Times New Roman" panose="02020603050405020304" pitchFamily="18" charset="0"/>
               </a:rPr>
               <a:t>Only </a:t>
             </a:r>
             <a:r>
-              <a:rPr lang="en" sz="2500" b="1" i="1" dirty="0">
+              <a:rPr lang="en" sz="2000" b="1" i="1" dirty="0">
                 <a:latin typeface="Times New Roman" panose="02020603050405020304" pitchFamily="18" charset="0"/>
                 <a:cs typeface="Times New Roman" panose="02020603050405020304" pitchFamily="18" charset="0"/>
               </a:rPr>
               <a:t>V</a:t>
             </a:r>
             <a:r>
-              <a:rPr lang="en" sz="2500" b="1" i="1" baseline="-25000" dirty="0">
+              <a:rPr lang="en" sz="2000" b="1" i="1" baseline="-25000" dirty="0">
                 <a:latin typeface="Times New Roman" panose="02020603050405020304" pitchFamily="18" charset="0"/>
                 <a:cs typeface="Times New Roman" panose="02020603050405020304" pitchFamily="18" charset="0"/>
               </a:rPr>
               <a:t>B </a:t>
             </a:r>
             <a:r>
-              <a:rPr lang="en" sz="2500" b="1" dirty="0">
+              <a:rPr lang="en" sz="2000" b="1" dirty="0">
                 <a:latin typeface="Times New Roman" panose="02020603050405020304" pitchFamily="18" charset="0"/>
                 <a:cs typeface="Times New Roman" panose="02020603050405020304" pitchFamily="18" charset="0"/>
               </a:rPr>
               <a:t>Invades</a:t>
             </a:r>
-            <a:endParaRPr sz="2500" b="1" dirty="0">
+            <a:endParaRPr sz="2000" b="1" dirty="0">
               <a:latin typeface="Times New Roman" panose="02020603050405020304" pitchFamily="18" charset="0"/>
               <a:cs typeface="Times New Roman" panose="02020603050405020304" pitchFamily="18" charset="0"/>
             </a:endParaRPr>
@@ -7734,7 +7628,7 @@
         </p:blipFill>
         <p:spPr>
           <a:xfrm>
-            <a:off x="24377078" y="13703751"/>
+            <a:off x="24377078" y="13602151"/>
             <a:ext cx="248146" cy="209527"/>
           </a:xfrm>
           <a:prstGeom prst="rect">
@@ -7768,7 +7662,7 @@
         </p:blipFill>
         <p:spPr>
           <a:xfrm>
-            <a:off x="24360638" y="13324235"/>
+            <a:off x="24360638" y="13222635"/>
             <a:ext cx="275053" cy="209527"/>
           </a:xfrm>
           <a:prstGeom prst="rect">
@@ -7802,7 +7696,7 @@
         </p:blipFill>
         <p:spPr>
           <a:xfrm>
-            <a:off x="24371101" y="14523671"/>
+            <a:off x="24371101" y="14422071"/>
             <a:ext cx="254125" cy="209527"/>
           </a:xfrm>
           <a:prstGeom prst="rect">
@@ -7828,13 +7722,13 @@
         </p:nvCxnSpPr>
         <p:spPr>
           <a:xfrm>
-            <a:off x="24652620" y="15296579"/>
+            <a:off x="24652620" y="15194979"/>
             <a:ext cx="0" cy="625694"/>
           </a:xfrm>
           <a:prstGeom prst="straightConnector1">
             <a:avLst/>
           </a:prstGeom>
-          <a:ln w="101600">
+          <a:ln w="63500">
             <a:solidFill>
               <a:srgbClr val="7F7F7F"/>
             </a:solidFill>
@@ -7871,13 +7765,13 @@
         </p:nvCxnSpPr>
         <p:spPr>
           <a:xfrm>
-            <a:off x="29877433" y="15296579"/>
+            <a:off x="29877433" y="15194979"/>
             <a:ext cx="0" cy="625694"/>
           </a:xfrm>
           <a:prstGeom prst="straightConnector1">
             <a:avLst/>
           </a:prstGeom>
-          <a:ln w="101600">
+          <a:ln w="63500">
             <a:solidFill>
               <a:srgbClr val="4E84C1"/>
             </a:solidFill>
@@ -7909,18 +7803,20 @@
               </a:ext>
             </a:extLst>
           </p:cNvPr>
-          <p:cNvCxnSpPr/>
+          <p:cNvCxnSpPr>
+            <a:cxnSpLocks/>
+          </p:cNvCxnSpPr>
           <p:nvPr/>
         </p:nvCxnSpPr>
         <p:spPr>
           <a:xfrm>
-            <a:off x="19549778" y="15262537"/>
-            <a:ext cx="0" cy="625694"/>
+            <a:off x="19615094" y="14487095"/>
+            <a:ext cx="0" cy="1364560"/>
           </a:xfrm>
           <a:prstGeom prst="straightConnector1">
             <a:avLst/>
           </a:prstGeom>
-          <a:ln w="101600">
+          <a:ln w="63500">
             <a:solidFill>
               <a:srgbClr val="7F7F7F"/>
             </a:solidFill>
@@ -7952,18 +7848,20 @@
               </a:ext>
             </a:extLst>
           </p:cNvPr>
-          <p:cNvCxnSpPr/>
+          <p:cNvCxnSpPr>
+            <a:cxnSpLocks/>
+          </p:cNvCxnSpPr>
           <p:nvPr/>
         </p:nvCxnSpPr>
         <p:spPr>
           <a:xfrm>
-            <a:off x="20496718" y="15249090"/>
-            <a:ext cx="0" cy="625694"/>
+            <a:off x="20513047" y="14495223"/>
+            <a:ext cx="0" cy="1351113"/>
           </a:xfrm>
           <a:prstGeom prst="straightConnector1">
             <a:avLst/>
           </a:prstGeom>
-          <a:ln w="101600">
+          <a:ln w="63500">
             <a:solidFill>
               <a:srgbClr val="4E84C1"/>
             </a:solidFill>
@@ -8002,13 +7900,13 @@
         </p:nvCxnSpPr>
         <p:spPr>
           <a:xfrm>
-            <a:off x="20204848" y="14470476"/>
+            <a:off x="20204848" y="14409643"/>
             <a:ext cx="0" cy="1431202"/>
           </a:xfrm>
           <a:prstGeom prst="straightConnector1">
             <a:avLst/>
           </a:prstGeom>
-          <a:ln w="101600">
+          <a:ln w="63500">
             <a:solidFill>
               <a:srgbClr val="999999"/>
             </a:solidFill>
@@ -8054,7 +7952,7 @@
         </p:blipFill>
         <p:spPr>
           <a:xfrm>
-            <a:off x="28687173" y="13704041"/>
+            <a:off x="28687173" y="13602441"/>
             <a:ext cx="248146" cy="209527"/>
           </a:xfrm>
           <a:prstGeom prst="rect">
@@ -8088,7 +7986,7 @@
         </p:blipFill>
         <p:spPr>
           <a:xfrm>
-            <a:off x="28670733" y="13324525"/>
+            <a:off x="28670733" y="13222925"/>
             <a:ext cx="275053" cy="209527"/>
           </a:xfrm>
           <a:prstGeom prst="rect">
@@ -8122,7 +8020,7 @@
         </p:blipFill>
         <p:spPr>
           <a:xfrm>
-            <a:off x="28681196" y="14523961"/>
+            <a:off x="28681196" y="14422361"/>
             <a:ext cx="254125" cy="209527"/>
           </a:xfrm>
           <a:prstGeom prst="rect">

</xml_diff>

<commit_message>
updated Brockhurst and some spacing at the airport
</commit_message>
<xml_diff>
--- a/JDH_poster_draft.pptx
+++ b/JDH_poster_draft.pptx
@@ -2973,10 +2973,10 @@
       </p:grpSpPr>
       <p:pic>
         <p:nvPicPr>
-          <p:cNvPr id="459" name="Picture 458">
-            <a:extLst>
-              <a:ext uri="{FF2B5EF4-FFF2-40B4-BE49-F238E27FC236}">
-                <a16:creationId xmlns:a16="http://schemas.microsoft.com/office/drawing/2014/main" id="{1B2F7D55-0991-56AF-4CF6-4D6E38C13EE4}"/>
+          <p:cNvPr id="466" name="Picture 465">
+            <a:extLst>
+              <a:ext uri="{FF2B5EF4-FFF2-40B4-BE49-F238E27FC236}">
+                <a16:creationId xmlns:a16="http://schemas.microsoft.com/office/drawing/2014/main" id="{1716A961-5F60-AA75-F674-9672179537D3}"/>
               </a:ext>
             </a:extLst>
           </p:cNvPr>
@@ -2993,8 +2993,8 @@
         </p:blipFill>
         <p:spPr>
           <a:xfrm>
-            <a:off x="2839389" y="26610821"/>
-            <a:ext cx="12407232" cy="5500372"/>
+            <a:off x="18169024" y="8448812"/>
+            <a:ext cx="4401917" cy="3255264"/>
           </a:xfrm>
           <a:prstGeom prst="rect">
             <a:avLst/>
@@ -3003,10 +3003,10 @@
       </p:pic>
       <p:pic>
         <p:nvPicPr>
-          <p:cNvPr id="455" name="Picture 454">
-            <a:extLst>
-              <a:ext uri="{FF2B5EF4-FFF2-40B4-BE49-F238E27FC236}">
-                <a16:creationId xmlns:a16="http://schemas.microsoft.com/office/drawing/2014/main" id="{AAA315A1-34A6-3EBF-3677-FD109878A384}"/>
+          <p:cNvPr id="459" name="Picture 458">
+            <a:extLst>
+              <a:ext uri="{FF2B5EF4-FFF2-40B4-BE49-F238E27FC236}">
+                <a16:creationId xmlns:a16="http://schemas.microsoft.com/office/drawing/2014/main" id="{1B2F7D55-0991-56AF-4CF6-4D6E38C13EE4}"/>
               </a:ext>
             </a:extLst>
           </p:cNvPr>
@@ -3023,8 +3023,8 @@
         </p:blipFill>
         <p:spPr>
           <a:xfrm>
-            <a:off x="18169024" y="12922862"/>
-            <a:ext cx="4340352" cy="3255264"/>
+            <a:off x="2839389" y="26610821"/>
+            <a:ext cx="12407232" cy="5500372"/>
           </a:xfrm>
           <a:prstGeom prst="rect">
             <a:avLst/>
@@ -3033,10 +3033,10 @@
       </p:pic>
       <p:pic>
         <p:nvPicPr>
-          <p:cNvPr id="446" name="Picture 445">
-            <a:extLst>
-              <a:ext uri="{FF2B5EF4-FFF2-40B4-BE49-F238E27FC236}">
-                <a16:creationId xmlns:a16="http://schemas.microsoft.com/office/drawing/2014/main" id="{DA068B06-CB6C-7985-BA5E-DF6C00680B64}"/>
+          <p:cNvPr id="455" name="Picture 454">
+            <a:extLst>
+              <a:ext uri="{FF2B5EF4-FFF2-40B4-BE49-F238E27FC236}">
+                <a16:creationId xmlns:a16="http://schemas.microsoft.com/office/drawing/2014/main" id="{AAA315A1-34A6-3EBF-3677-FD109878A384}"/>
               </a:ext>
             </a:extLst>
           </p:cNvPr>
@@ -3053,8 +3053,8 @@
         </p:blipFill>
         <p:spPr>
           <a:xfrm>
-            <a:off x="27587825" y="12966641"/>
-            <a:ext cx="4269695" cy="3255264"/>
+            <a:off x="18169024" y="12922862"/>
+            <a:ext cx="4340352" cy="3255264"/>
           </a:xfrm>
           <a:prstGeom prst="rect">
             <a:avLst/>
@@ -3063,10 +3063,10 @@
       </p:pic>
       <p:pic>
         <p:nvPicPr>
-          <p:cNvPr id="448" name="Picture 447">
-            <a:extLst>
-              <a:ext uri="{FF2B5EF4-FFF2-40B4-BE49-F238E27FC236}">
-                <a16:creationId xmlns:a16="http://schemas.microsoft.com/office/drawing/2014/main" id="{022BDBC8-8C10-23CF-E743-E77D08BBB281}"/>
+          <p:cNvPr id="446" name="Picture 445">
+            <a:extLst>
+              <a:ext uri="{FF2B5EF4-FFF2-40B4-BE49-F238E27FC236}">
+                <a16:creationId xmlns:a16="http://schemas.microsoft.com/office/drawing/2014/main" id="{DA068B06-CB6C-7985-BA5E-DF6C00680B64}"/>
               </a:ext>
             </a:extLst>
           </p:cNvPr>
@@ -3083,7 +3083,7 @@
         </p:blipFill>
         <p:spPr>
           <a:xfrm>
-            <a:off x="23215720" y="12966641"/>
+            <a:off x="27587825" y="12966641"/>
             <a:ext cx="4269695" cy="3255264"/>
           </a:xfrm>
           <a:prstGeom prst="rect">
@@ -3093,10 +3093,10 @@
       </p:pic>
       <p:pic>
         <p:nvPicPr>
-          <p:cNvPr id="442" name="Picture 441">
-            <a:extLst>
-              <a:ext uri="{FF2B5EF4-FFF2-40B4-BE49-F238E27FC236}">
-                <a16:creationId xmlns:a16="http://schemas.microsoft.com/office/drawing/2014/main" id="{CE596BD8-CA7F-1434-3FA1-3BBB7E702F27}"/>
+          <p:cNvPr id="448" name="Picture 447">
+            <a:extLst>
+              <a:ext uri="{FF2B5EF4-FFF2-40B4-BE49-F238E27FC236}">
+                <a16:creationId xmlns:a16="http://schemas.microsoft.com/office/drawing/2014/main" id="{022BDBC8-8C10-23CF-E743-E77D08BBB281}"/>
               </a:ext>
             </a:extLst>
           </p:cNvPr>
@@ -3113,7 +3113,7 @@
         </p:blipFill>
         <p:spPr>
           <a:xfrm>
-            <a:off x="27460825" y="8444098"/>
+            <a:off x="23215720" y="12966641"/>
             <a:ext cx="4269695" cy="3255264"/>
           </a:xfrm>
           <a:prstGeom prst="rect">
@@ -3123,10 +3123,10 @@
       </p:pic>
       <p:pic>
         <p:nvPicPr>
-          <p:cNvPr id="444" name="Picture 443">
-            <a:extLst>
-              <a:ext uri="{FF2B5EF4-FFF2-40B4-BE49-F238E27FC236}">
-                <a16:creationId xmlns:a16="http://schemas.microsoft.com/office/drawing/2014/main" id="{2BFDD001-A094-0EFA-8154-94905A0E5589}"/>
+          <p:cNvPr id="442" name="Picture 441">
+            <a:extLst>
+              <a:ext uri="{FF2B5EF4-FFF2-40B4-BE49-F238E27FC236}">
+                <a16:creationId xmlns:a16="http://schemas.microsoft.com/office/drawing/2014/main" id="{CE596BD8-CA7F-1434-3FA1-3BBB7E702F27}"/>
               </a:ext>
             </a:extLst>
           </p:cNvPr>
@@ -3143,7 +3143,7 @@
         </p:blipFill>
         <p:spPr>
           <a:xfrm>
-            <a:off x="23165106" y="8446200"/>
+            <a:off x="27460825" y="8444098"/>
             <a:ext cx="4269695" cy="3255264"/>
           </a:xfrm>
           <a:prstGeom prst="rect">
@@ -3153,10 +3153,10 @@
       </p:pic>
       <p:pic>
         <p:nvPicPr>
-          <p:cNvPr id="440" name="Picture 439">
-            <a:extLst>
-              <a:ext uri="{FF2B5EF4-FFF2-40B4-BE49-F238E27FC236}">
-                <a16:creationId xmlns:a16="http://schemas.microsoft.com/office/drawing/2014/main" id="{09C23625-DFD4-943B-69DA-C9FDCA84D822}"/>
+          <p:cNvPr id="444" name="Picture 443">
+            <a:extLst>
+              <a:ext uri="{FF2B5EF4-FFF2-40B4-BE49-F238E27FC236}">
+                <a16:creationId xmlns:a16="http://schemas.microsoft.com/office/drawing/2014/main" id="{2BFDD001-A094-0EFA-8154-94905A0E5589}"/>
               </a:ext>
             </a:extLst>
           </p:cNvPr>
@@ -3173,8 +3173,8 @@
         </p:blipFill>
         <p:spPr>
           <a:xfrm>
-            <a:off x="18170452" y="8446407"/>
-            <a:ext cx="4373779" cy="3255264"/>
+            <a:off x="23165106" y="8446200"/>
+            <a:ext cx="4269695" cy="3255264"/>
           </a:xfrm>
           <a:prstGeom prst="rect">
             <a:avLst/>

</xml_diff>